<commit_message>
Finalização do PM_Canvas com aprovação do Professor de PI + Figma do Tiago
</commit_message>
<xml_diff>
--- a/PM_CANVAS/Faculdade_pm_canvas.pptx
+++ b/PM_CANVAS/Faculdade_pm_canvas.pptx
@@ -104,6 +104,11 @@
       </a:defRPr>
     </a:lvl9pPr>
   </p:defaultTextStyle>
+  <p:extLst>
+    <p:ext uri="{EFAFB233-063F-42B5-8137-9DF3F51BA10A}">
+      <p15:sldGuideLst xmlns:p15="http://schemas.microsoft.com/office/powerpoint/2012/main"/>
+    </p:ext>
+  </p:extLst>
 </p:presentation>
 </file>
 
@@ -149,10 +154,9 @@
           </a:lstStyle>
           <a:p>
             <a:r>
-              <a:rPr lang="pt-BR" smtClean="0"/>
+              <a:rPr lang="pt-BR"/>
               <a:t>Clique para editar o título mestre</a:t>
             </a:r>
-            <a:endParaRPr lang="pt-BR"/>
           </a:p>
         </p:txBody>
       </p:sp>
@@ -214,10 +218,9 @@
           </a:lstStyle>
           <a:p>
             <a:r>
-              <a:rPr lang="pt-BR" smtClean="0"/>
+              <a:rPr lang="pt-BR"/>
               <a:t>Clique para editar o estilo do subtítulo Mestre</a:t>
             </a:r>
-            <a:endParaRPr lang="pt-BR"/>
           </a:p>
         </p:txBody>
       </p:sp>
@@ -332,10 +335,9 @@
           <a:lstStyle/>
           <a:p>
             <a:r>
-              <a:rPr lang="pt-BR" smtClean="0"/>
+              <a:rPr lang="pt-BR"/>
               <a:t>Clique para editar o título mestre</a:t>
             </a:r>
-            <a:endParaRPr lang="pt-BR"/>
           </a:p>
         </p:txBody>
       </p:sp>
@@ -356,38 +358,37 @@
           <a:p>
             <a:pPr lvl="0"/>
             <a:r>
-              <a:rPr lang="pt-BR" smtClean="0"/>
+              <a:rPr lang="pt-BR"/>
               <a:t>Editar estilos de texto Mestre</a:t>
             </a:r>
           </a:p>
           <a:p>
             <a:pPr lvl="1"/>
             <a:r>
-              <a:rPr lang="pt-BR" smtClean="0"/>
+              <a:rPr lang="pt-BR"/>
               <a:t>Segundo nível</a:t>
             </a:r>
           </a:p>
           <a:p>
             <a:pPr lvl="2"/>
             <a:r>
-              <a:rPr lang="pt-BR" smtClean="0"/>
+              <a:rPr lang="pt-BR"/>
               <a:t>Terceiro nível</a:t>
             </a:r>
           </a:p>
           <a:p>
             <a:pPr lvl="3"/>
             <a:r>
-              <a:rPr lang="pt-BR" smtClean="0"/>
+              <a:rPr lang="pt-BR"/>
               <a:t>Quarto nível</a:t>
             </a:r>
           </a:p>
           <a:p>
             <a:pPr lvl="4"/>
             <a:r>
-              <a:rPr lang="pt-BR" smtClean="0"/>
+              <a:rPr lang="pt-BR"/>
               <a:t>Quinto nível</a:t>
             </a:r>
-            <a:endParaRPr lang="pt-BR"/>
           </a:p>
         </p:txBody>
       </p:sp>
@@ -507,10 +508,9 @@
           <a:lstStyle/>
           <a:p>
             <a:r>
-              <a:rPr lang="pt-BR" smtClean="0"/>
+              <a:rPr lang="pt-BR"/>
               <a:t>Clique para editar o título mestre</a:t>
             </a:r>
-            <a:endParaRPr lang="pt-BR"/>
           </a:p>
         </p:txBody>
       </p:sp>
@@ -536,38 +536,37 @@
           <a:p>
             <a:pPr lvl="0"/>
             <a:r>
-              <a:rPr lang="pt-BR" smtClean="0"/>
+              <a:rPr lang="pt-BR"/>
               <a:t>Editar estilos de texto Mestre</a:t>
             </a:r>
           </a:p>
           <a:p>
             <a:pPr lvl="1"/>
             <a:r>
-              <a:rPr lang="pt-BR" smtClean="0"/>
+              <a:rPr lang="pt-BR"/>
               <a:t>Segundo nível</a:t>
             </a:r>
           </a:p>
           <a:p>
             <a:pPr lvl="2"/>
             <a:r>
-              <a:rPr lang="pt-BR" smtClean="0"/>
+              <a:rPr lang="pt-BR"/>
               <a:t>Terceiro nível</a:t>
             </a:r>
           </a:p>
           <a:p>
             <a:pPr lvl="3"/>
             <a:r>
-              <a:rPr lang="pt-BR" smtClean="0"/>
+              <a:rPr lang="pt-BR"/>
               <a:t>Quarto nível</a:t>
             </a:r>
           </a:p>
           <a:p>
             <a:pPr lvl="4"/>
             <a:r>
-              <a:rPr lang="pt-BR" smtClean="0"/>
+              <a:rPr lang="pt-BR"/>
               <a:t>Quinto nível</a:t>
             </a:r>
-            <a:endParaRPr lang="pt-BR"/>
           </a:p>
         </p:txBody>
       </p:sp>
@@ -682,10 +681,9 @@
           <a:lstStyle/>
           <a:p>
             <a:r>
-              <a:rPr lang="pt-BR" smtClean="0"/>
+              <a:rPr lang="pt-BR"/>
               <a:t>Clique para editar o título mestre</a:t>
             </a:r>
-            <a:endParaRPr lang="pt-BR"/>
           </a:p>
         </p:txBody>
       </p:sp>
@@ -706,38 +704,37 @@
           <a:p>
             <a:pPr lvl="0"/>
             <a:r>
-              <a:rPr lang="pt-BR" smtClean="0"/>
+              <a:rPr lang="pt-BR"/>
               <a:t>Editar estilos de texto Mestre</a:t>
             </a:r>
           </a:p>
           <a:p>
             <a:pPr lvl="1"/>
             <a:r>
-              <a:rPr lang="pt-BR" smtClean="0"/>
+              <a:rPr lang="pt-BR"/>
               <a:t>Segundo nível</a:t>
             </a:r>
           </a:p>
           <a:p>
             <a:pPr lvl="2"/>
             <a:r>
-              <a:rPr lang="pt-BR" smtClean="0"/>
+              <a:rPr lang="pt-BR"/>
               <a:t>Terceiro nível</a:t>
             </a:r>
           </a:p>
           <a:p>
             <a:pPr lvl="3"/>
             <a:r>
-              <a:rPr lang="pt-BR" smtClean="0"/>
+              <a:rPr lang="pt-BR"/>
               <a:t>Quarto nível</a:t>
             </a:r>
           </a:p>
           <a:p>
             <a:pPr lvl="4"/>
             <a:r>
-              <a:rPr lang="pt-BR" smtClean="0"/>
+              <a:rPr lang="pt-BR"/>
               <a:t>Quinto nível</a:t>
             </a:r>
-            <a:endParaRPr lang="pt-BR"/>
           </a:p>
         </p:txBody>
       </p:sp>
@@ -861,10 +858,9 @@
           </a:lstStyle>
           <a:p>
             <a:r>
-              <a:rPr lang="pt-BR" smtClean="0"/>
+              <a:rPr lang="pt-BR"/>
               <a:t>Clique para editar o título mestre</a:t>
             </a:r>
-            <a:endParaRPr lang="pt-BR"/>
           </a:p>
         </p:txBody>
       </p:sp>
@@ -981,7 +977,7 @@
           <a:p>
             <a:pPr lvl="0"/>
             <a:r>
-              <a:rPr lang="pt-BR" smtClean="0"/>
+              <a:rPr lang="pt-BR"/>
               <a:t>Editar estilos de texto Mestre</a:t>
             </a:r>
           </a:p>
@@ -1098,10 +1094,9 @@
           <a:lstStyle/>
           <a:p>
             <a:r>
-              <a:rPr lang="pt-BR" smtClean="0"/>
+              <a:rPr lang="pt-BR"/>
               <a:t>Clique para editar o título mestre</a:t>
             </a:r>
-            <a:endParaRPr lang="pt-BR"/>
           </a:p>
         </p:txBody>
       </p:sp>
@@ -1127,38 +1122,37 @@
           <a:p>
             <a:pPr lvl="0"/>
             <a:r>
-              <a:rPr lang="pt-BR" smtClean="0"/>
+              <a:rPr lang="pt-BR"/>
               <a:t>Editar estilos de texto Mestre</a:t>
             </a:r>
           </a:p>
           <a:p>
             <a:pPr lvl="1"/>
             <a:r>
-              <a:rPr lang="pt-BR" smtClean="0"/>
+              <a:rPr lang="pt-BR"/>
               <a:t>Segundo nível</a:t>
             </a:r>
           </a:p>
           <a:p>
             <a:pPr lvl="2"/>
             <a:r>
-              <a:rPr lang="pt-BR" smtClean="0"/>
+              <a:rPr lang="pt-BR"/>
               <a:t>Terceiro nível</a:t>
             </a:r>
           </a:p>
           <a:p>
             <a:pPr lvl="3"/>
             <a:r>
-              <a:rPr lang="pt-BR" smtClean="0"/>
+              <a:rPr lang="pt-BR"/>
               <a:t>Quarto nível</a:t>
             </a:r>
           </a:p>
           <a:p>
             <a:pPr lvl="4"/>
             <a:r>
-              <a:rPr lang="pt-BR" smtClean="0"/>
+              <a:rPr lang="pt-BR"/>
               <a:t>Quinto nível</a:t>
             </a:r>
-            <a:endParaRPr lang="pt-BR"/>
           </a:p>
         </p:txBody>
       </p:sp>
@@ -1184,38 +1178,37 @@
           <a:p>
             <a:pPr lvl="0"/>
             <a:r>
-              <a:rPr lang="pt-BR" smtClean="0"/>
+              <a:rPr lang="pt-BR"/>
               <a:t>Editar estilos de texto Mestre</a:t>
             </a:r>
           </a:p>
           <a:p>
             <a:pPr lvl="1"/>
             <a:r>
-              <a:rPr lang="pt-BR" smtClean="0"/>
+              <a:rPr lang="pt-BR"/>
               <a:t>Segundo nível</a:t>
             </a:r>
           </a:p>
           <a:p>
             <a:pPr lvl="2"/>
             <a:r>
-              <a:rPr lang="pt-BR" smtClean="0"/>
+              <a:rPr lang="pt-BR"/>
               <a:t>Terceiro nível</a:t>
             </a:r>
           </a:p>
           <a:p>
             <a:pPr lvl="3"/>
             <a:r>
-              <a:rPr lang="pt-BR" smtClean="0"/>
+              <a:rPr lang="pt-BR"/>
               <a:t>Quarto nível</a:t>
             </a:r>
           </a:p>
           <a:p>
             <a:pPr lvl="4"/>
             <a:r>
-              <a:rPr lang="pt-BR" smtClean="0"/>
+              <a:rPr lang="pt-BR"/>
               <a:t>Quinto nível</a:t>
             </a:r>
-            <a:endParaRPr lang="pt-BR"/>
           </a:p>
         </p:txBody>
       </p:sp>
@@ -1335,10 +1328,9 @@
           <a:lstStyle/>
           <a:p>
             <a:r>
-              <a:rPr lang="pt-BR" smtClean="0"/>
+              <a:rPr lang="pt-BR"/>
               <a:t>Clique para editar o título mestre</a:t>
             </a:r>
-            <a:endParaRPr lang="pt-BR"/>
           </a:p>
         </p:txBody>
       </p:sp>
@@ -1401,7 +1393,7 @@
           <a:p>
             <a:pPr lvl="0"/>
             <a:r>
-              <a:rPr lang="pt-BR" smtClean="0"/>
+              <a:rPr lang="pt-BR"/>
               <a:t>Editar estilos de texto Mestre</a:t>
             </a:r>
           </a:p>
@@ -1429,38 +1421,37 @@
           <a:p>
             <a:pPr lvl="0"/>
             <a:r>
-              <a:rPr lang="pt-BR" smtClean="0"/>
+              <a:rPr lang="pt-BR"/>
               <a:t>Editar estilos de texto Mestre</a:t>
             </a:r>
           </a:p>
           <a:p>
             <a:pPr lvl="1"/>
             <a:r>
-              <a:rPr lang="pt-BR" smtClean="0"/>
+              <a:rPr lang="pt-BR"/>
               <a:t>Segundo nível</a:t>
             </a:r>
           </a:p>
           <a:p>
             <a:pPr lvl="2"/>
             <a:r>
-              <a:rPr lang="pt-BR" smtClean="0"/>
+              <a:rPr lang="pt-BR"/>
               <a:t>Terceiro nível</a:t>
             </a:r>
           </a:p>
           <a:p>
             <a:pPr lvl="3"/>
             <a:r>
-              <a:rPr lang="pt-BR" smtClean="0"/>
+              <a:rPr lang="pt-BR"/>
               <a:t>Quarto nível</a:t>
             </a:r>
           </a:p>
           <a:p>
             <a:pPr lvl="4"/>
             <a:r>
-              <a:rPr lang="pt-BR" smtClean="0"/>
+              <a:rPr lang="pt-BR"/>
               <a:t>Quinto nível</a:t>
             </a:r>
-            <a:endParaRPr lang="pt-BR"/>
           </a:p>
         </p:txBody>
       </p:sp>
@@ -1523,7 +1514,7 @@
           <a:p>
             <a:pPr lvl="0"/>
             <a:r>
-              <a:rPr lang="pt-BR" smtClean="0"/>
+              <a:rPr lang="pt-BR"/>
               <a:t>Editar estilos de texto Mestre</a:t>
             </a:r>
           </a:p>
@@ -1551,38 +1542,37 @@
           <a:p>
             <a:pPr lvl="0"/>
             <a:r>
-              <a:rPr lang="pt-BR" smtClean="0"/>
+              <a:rPr lang="pt-BR"/>
               <a:t>Editar estilos de texto Mestre</a:t>
             </a:r>
           </a:p>
           <a:p>
             <a:pPr lvl="1"/>
             <a:r>
-              <a:rPr lang="pt-BR" smtClean="0"/>
+              <a:rPr lang="pt-BR"/>
               <a:t>Segundo nível</a:t>
             </a:r>
           </a:p>
           <a:p>
             <a:pPr lvl="2"/>
             <a:r>
-              <a:rPr lang="pt-BR" smtClean="0"/>
+              <a:rPr lang="pt-BR"/>
               <a:t>Terceiro nível</a:t>
             </a:r>
           </a:p>
           <a:p>
             <a:pPr lvl="3"/>
             <a:r>
-              <a:rPr lang="pt-BR" smtClean="0"/>
+              <a:rPr lang="pt-BR"/>
               <a:t>Quarto nível</a:t>
             </a:r>
           </a:p>
           <a:p>
             <a:pPr lvl="4"/>
             <a:r>
-              <a:rPr lang="pt-BR" smtClean="0"/>
+              <a:rPr lang="pt-BR"/>
               <a:t>Quinto nível</a:t>
             </a:r>
-            <a:endParaRPr lang="pt-BR"/>
           </a:p>
         </p:txBody>
       </p:sp>
@@ -1697,10 +1687,9 @@
           <a:lstStyle/>
           <a:p>
             <a:r>
-              <a:rPr lang="pt-BR" smtClean="0"/>
+              <a:rPr lang="pt-BR"/>
               <a:t>Clique para editar o título mestre</a:t>
             </a:r>
-            <a:endParaRPr lang="pt-BR"/>
           </a:p>
         </p:txBody>
       </p:sp>
@@ -1919,10 +1908,9 @@
           </a:lstStyle>
           <a:p>
             <a:r>
-              <a:rPr lang="pt-BR" smtClean="0"/>
+              <a:rPr lang="pt-BR"/>
               <a:t>Clique para editar o título mestre</a:t>
             </a:r>
-            <a:endParaRPr lang="pt-BR"/>
           </a:p>
         </p:txBody>
       </p:sp>
@@ -1976,38 +1964,37 @@
           <a:p>
             <a:pPr lvl="0"/>
             <a:r>
-              <a:rPr lang="pt-BR" smtClean="0"/>
+              <a:rPr lang="pt-BR"/>
               <a:t>Editar estilos de texto Mestre</a:t>
             </a:r>
           </a:p>
           <a:p>
             <a:pPr lvl="1"/>
             <a:r>
-              <a:rPr lang="pt-BR" smtClean="0"/>
+              <a:rPr lang="pt-BR"/>
               <a:t>Segundo nível</a:t>
             </a:r>
           </a:p>
           <a:p>
             <a:pPr lvl="2"/>
             <a:r>
-              <a:rPr lang="pt-BR" smtClean="0"/>
+              <a:rPr lang="pt-BR"/>
               <a:t>Terceiro nível</a:t>
             </a:r>
           </a:p>
           <a:p>
             <a:pPr lvl="3"/>
             <a:r>
-              <a:rPr lang="pt-BR" smtClean="0"/>
+              <a:rPr lang="pt-BR"/>
               <a:t>Quarto nível</a:t>
             </a:r>
           </a:p>
           <a:p>
             <a:pPr lvl="4"/>
             <a:r>
-              <a:rPr lang="pt-BR" smtClean="0"/>
+              <a:rPr lang="pt-BR"/>
               <a:t>Quinto nível</a:t>
             </a:r>
-            <a:endParaRPr lang="pt-BR"/>
           </a:p>
         </p:txBody>
       </p:sp>
@@ -2070,7 +2057,7 @@
           <a:p>
             <a:pPr lvl="0"/>
             <a:r>
-              <a:rPr lang="pt-BR" smtClean="0"/>
+              <a:rPr lang="pt-BR"/>
               <a:t>Editar estilos de texto Mestre</a:t>
             </a:r>
           </a:p>
@@ -2196,10 +2183,9 @@
           </a:lstStyle>
           <a:p>
             <a:r>
-              <a:rPr lang="pt-BR" smtClean="0"/>
+              <a:rPr lang="pt-BR"/>
               <a:t>Clique para editar o título mestre</a:t>
             </a:r>
-            <a:endParaRPr lang="pt-BR"/>
           </a:p>
         </p:txBody>
       </p:sp>
@@ -2323,7 +2309,7 @@
           <a:p>
             <a:pPr lvl="0"/>
             <a:r>
-              <a:rPr lang="pt-BR" smtClean="0"/>
+              <a:rPr lang="pt-BR"/>
               <a:t>Editar estilos de texto Mestre</a:t>
             </a:r>
           </a:p>
@@ -2455,10 +2441,9 @@
           <a:lstStyle/>
           <a:p>
             <a:r>
-              <a:rPr lang="pt-BR" smtClean="0"/>
+              <a:rPr lang="pt-BR"/>
               <a:t>Clique para editar o título mestre</a:t>
             </a:r>
-            <a:endParaRPr lang="pt-BR"/>
           </a:p>
         </p:txBody>
       </p:sp>
@@ -2489,38 +2474,37 @@
           <a:p>
             <a:pPr lvl="0"/>
             <a:r>
-              <a:rPr lang="pt-BR" smtClean="0"/>
+              <a:rPr lang="pt-BR"/>
               <a:t>Editar estilos de texto Mestre</a:t>
             </a:r>
           </a:p>
           <a:p>
             <a:pPr lvl="1"/>
             <a:r>
-              <a:rPr lang="pt-BR" smtClean="0"/>
+              <a:rPr lang="pt-BR"/>
               <a:t>Segundo nível</a:t>
             </a:r>
           </a:p>
           <a:p>
             <a:pPr lvl="2"/>
             <a:r>
-              <a:rPr lang="pt-BR" smtClean="0"/>
+              <a:rPr lang="pt-BR"/>
               <a:t>Terceiro nível</a:t>
             </a:r>
           </a:p>
           <a:p>
             <a:pPr lvl="3"/>
             <a:r>
-              <a:rPr lang="pt-BR" smtClean="0"/>
+              <a:rPr lang="pt-BR"/>
               <a:t>Quarto nível</a:t>
             </a:r>
           </a:p>
           <a:p>
             <a:pPr lvl="4"/>
             <a:r>
-              <a:rPr lang="pt-BR" smtClean="0"/>
+              <a:rPr lang="pt-BR"/>
               <a:t>Quinto nível</a:t>
             </a:r>
-            <a:endParaRPr lang="pt-BR"/>
           </a:p>
         </p:txBody>
       </p:sp>
@@ -2990,14 +2974,216 @@
       </p:pic>
       <p:sp>
         <p:nvSpPr>
-          <p:cNvPr id="30" name="Canto Dobrado 29"/>
+          <p:cNvPr id="29" name="Canto Dobrado 28"/>
           <p:cNvSpPr/>
           <p:nvPr/>
         </p:nvSpPr>
         <p:spPr>
           <a:xfrm>
-            <a:off x="3544089" y="4655990"/>
-            <a:ext cx="1371600" cy="1003300"/>
+            <a:off x="3212208" y="3234525"/>
+            <a:ext cx="2090143" cy="3211119"/>
+          </a:xfrm>
+          <a:prstGeom prst="foldedCorner">
+            <a:avLst>
+              <a:gd name="adj" fmla="val 12800"/>
+            </a:avLst>
+          </a:prstGeom>
+          <a:solidFill>
+            <a:srgbClr val="FFFF00"/>
+          </a:solidFill>
+          <a:ln>
+            <a:solidFill>
+              <a:schemeClr val="tx1"/>
+            </a:solidFill>
+          </a:ln>
+        </p:spPr>
+        <p:style>
+          <a:lnRef idx="2">
+            <a:schemeClr val="accent1">
+              <a:shade val="50000"/>
+            </a:schemeClr>
+          </a:lnRef>
+          <a:fillRef idx="1">
+            <a:schemeClr val="accent1"/>
+          </a:fillRef>
+          <a:effectRef idx="0">
+            <a:schemeClr val="accent1"/>
+          </a:effectRef>
+          <a:fontRef idx="minor">
+            <a:schemeClr val="lt1"/>
+          </a:fontRef>
+        </p:style>
+        <p:txBody>
+          <a:bodyPr rtlCol="0" anchor="t"/>
+          <a:lstStyle/>
+          <a:p>
+            <a:pPr marL="285750" indent="-285750">
+              <a:buFont typeface="Arial" panose="020B0604020202020204" pitchFamily="34" charset="0"/>
+              <a:buChar char="•"/>
+            </a:pPr>
+            <a:r>
+              <a:rPr lang="pt-BR" dirty="0" err="1">
+                <a:solidFill>
+                  <a:schemeClr val="tx1"/>
+                </a:solidFill>
+              </a:rPr>
+              <a:t>Voxel</a:t>
+            </a:r>
+            <a:endParaRPr lang="pt-BR" dirty="0">
+              <a:solidFill>
+                <a:schemeClr val="tx1"/>
+              </a:solidFill>
+            </a:endParaRPr>
+          </a:p>
+          <a:p>
+            <a:pPr marL="285750" indent="-285750">
+              <a:buFont typeface="Arial" panose="020B0604020202020204" pitchFamily="34" charset="0"/>
+              <a:buChar char="•"/>
+            </a:pPr>
+            <a:r>
+              <a:rPr lang="pt-BR" dirty="0" err="1">
+                <a:solidFill>
+                  <a:schemeClr val="tx1"/>
+                </a:solidFill>
+              </a:rPr>
+              <a:t>Unity</a:t>
+            </a:r>
+            <a:endParaRPr lang="pt-BR" dirty="0">
+              <a:solidFill>
+                <a:schemeClr val="tx1"/>
+              </a:solidFill>
+            </a:endParaRPr>
+          </a:p>
+          <a:p>
+            <a:pPr marL="285750" indent="-285750">
+              <a:buFont typeface="Arial" panose="020B0604020202020204" pitchFamily="34" charset="0"/>
+              <a:buChar char="•"/>
+            </a:pPr>
+            <a:r>
+              <a:rPr lang="pt-BR" dirty="0">
+                <a:solidFill>
+                  <a:schemeClr val="tx1"/>
+                </a:solidFill>
+              </a:rPr>
+              <a:t>Tela Funcional</a:t>
+            </a:r>
+          </a:p>
+          <a:p>
+            <a:pPr marL="285750" indent="-285750">
+              <a:buFont typeface="Arial" panose="020B0604020202020204" pitchFamily="34" charset="0"/>
+              <a:buChar char="•"/>
+            </a:pPr>
+            <a:r>
+              <a:rPr lang="pt-BR" dirty="0" err="1">
+                <a:solidFill>
+                  <a:schemeClr val="tx1"/>
+                </a:solidFill>
+              </a:rPr>
+              <a:t>Kottlin</a:t>
+            </a:r>
+            <a:endParaRPr lang="pt-BR" dirty="0">
+              <a:solidFill>
+                <a:schemeClr val="tx1"/>
+              </a:solidFill>
+            </a:endParaRPr>
+          </a:p>
+          <a:p>
+            <a:pPr marL="285750" indent="-285750">
+              <a:buFont typeface="Arial" panose="020B0604020202020204" pitchFamily="34" charset="0"/>
+              <a:buChar char="•"/>
+            </a:pPr>
+            <a:r>
+              <a:rPr lang="pt-BR" dirty="0">
+                <a:solidFill>
+                  <a:schemeClr val="tx1"/>
+                </a:solidFill>
+              </a:rPr>
+              <a:t>Funcionar </a:t>
+            </a:r>
+            <a:r>
+              <a:rPr lang="pt-BR" dirty="0" err="1">
+                <a:solidFill>
+                  <a:schemeClr val="tx1"/>
+                </a:solidFill>
+              </a:rPr>
+              <a:t>Offiline</a:t>
+            </a:r>
+            <a:r>
+              <a:rPr lang="pt-BR" dirty="0">
+                <a:solidFill>
+                  <a:schemeClr val="tx1"/>
+                </a:solidFill>
+              </a:rPr>
+              <a:t> </a:t>
+            </a:r>
+          </a:p>
+          <a:p>
+            <a:pPr marL="285750" indent="-285750">
+              <a:buFont typeface="Arial" panose="020B0604020202020204" pitchFamily="34" charset="0"/>
+              <a:buChar char="•"/>
+            </a:pPr>
+            <a:r>
+              <a:rPr lang="pt-BR" dirty="0">
+                <a:solidFill>
+                  <a:schemeClr val="tx1"/>
+                </a:solidFill>
+              </a:rPr>
+              <a:t>Capturar </a:t>
+            </a:r>
+            <a:r>
+              <a:rPr lang="pt-BR" dirty="0" err="1">
+                <a:solidFill>
+                  <a:schemeClr val="tx1"/>
+                </a:solidFill>
+              </a:rPr>
+              <a:t>Metricas</a:t>
+            </a:r>
+            <a:endParaRPr lang="pt-BR" dirty="0">
+              <a:solidFill>
+                <a:schemeClr val="tx1"/>
+              </a:solidFill>
+            </a:endParaRPr>
+          </a:p>
+          <a:p>
+            <a:pPr marL="285750" indent="-285750">
+              <a:buFont typeface="Arial" panose="020B0604020202020204" pitchFamily="34" charset="0"/>
+              <a:buChar char="•"/>
+            </a:pPr>
+            <a:r>
+              <a:rPr lang="pt-BR" dirty="0">
+                <a:solidFill>
+                  <a:schemeClr val="tx1"/>
+                </a:solidFill>
+              </a:rPr>
+              <a:t>Analise Preditiva</a:t>
+            </a:r>
+          </a:p>
+          <a:p>
+            <a:pPr marL="285750" indent="-285750">
+              <a:buFont typeface="Arial" panose="020B0604020202020204" pitchFamily="34" charset="0"/>
+              <a:buChar char="•"/>
+            </a:pPr>
+            <a:r>
+              <a:rPr lang="pt-BR" dirty="0">
+                <a:solidFill>
+                  <a:schemeClr val="tx1"/>
+                </a:solidFill>
+              </a:rPr>
+              <a:t>Loja com itens para venda</a:t>
+            </a:r>
+          </a:p>
+        </p:txBody>
+      </p:sp>
+      <p:sp>
+        <p:nvSpPr>
+          <p:cNvPr id="18" name="Canto Dobrado 17"/>
+          <p:cNvSpPr/>
+          <p:nvPr/>
+        </p:nvSpPr>
+        <p:spPr>
+          <a:xfrm>
+            <a:off x="2035081" y="2536727"/>
+            <a:ext cx="1476563" cy="1223393"/>
           </a:xfrm>
           <a:prstGeom prst="foldedCorner">
             <a:avLst/>
@@ -3031,21 +3217,27 @@
           <a:bodyPr rtlCol="0" anchor="ctr"/>
           <a:lstStyle/>
           <a:p>
-            <a:pPr algn="ctr"/>
-            <a:endParaRPr lang="pt-BR"/>
-          </a:p>
-        </p:txBody>
-      </p:sp>
-      <p:sp>
-        <p:nvSpPr>
-          <p:cNvPr id="18" name="Canto Dobrado 17"/>
+            <a:r>
+              <a:rPr lang="pt-BR" dirty="0">
+                <a:solidFill>
+                  <a:schemeClr val="tx1"/>
+                </a:solidFill>
+              </a:rPr>
+              <a:t>assim dando um retorno maior aos investidores</a:t>
+            </a:r>
+          </a:p>
+        </p:txBody>
+      </p:sp>
+      <p:sp>
+        <p:nvSpPr>
+          <p:cNvPr id="7" name="Canto Dobrado 6"/>
           <p:cNvSpPr/>
           <p:nvPr/>
         </p:nvSpPr>
         <p:spPr>
           <a:xfrm>
-            <a:off x="2035081" y="2536727"/>
-            <a:ext cx="1743170" cy="1223393"/>
+            <a:off x="1404045" y="821435"/>
+            <a:ext cx="1805880" cy="1151559"/>
           </a:xfrm>
           <a:prstGeom prst="foldedCorner">
             <a:avLst/>
@@ -3079,67 +3271,42 @@
           <a:bodyPr rtlCol="0" anchor="ctr"/>
           <a:lstStyle/>
           <a:p>
-            <a:r>
-              <a:rPr lang="pt-BR" dirty="0" smtClean="0">
-                <a:solidFill>
-                  <a:schemeClr val="tx1"/>
-                </a:solidFill>
-              </a:rPr>
-              <a:t>assim dando um retorno maior aos investidores</a:t>
-            </a:r>
-            <a:endParaRPr lang="pt-BR" dirty="0">
+            <a:endParaRPr lang="pt-BR" sz="1500" dirty="0">
               <a:solidFill>
                 <a:schemeClr val="tx1"/>
               </a:solidFill>
             </a:endParaRPr>
           </a:p>
-        </p:txBody>
-      </p:sp>
-      <p:sp>
-        <p:nvSpPr>
-          <p:cNvPr id="7" name="Canto Dobrado 6"/>
-          <p:cNvSpPr/>
-          <p:nvPr/>
-        </p:nvSpPr>
-        <p:spPr>
-          <a:xfrm>
-            <a:off x="1498600" y="838200"/>
-            <a:ext cx="1371600" cy="1003300"/>
-          </a:xfrm>
-          <a:prstGeom prst="foldedCorner">
-            <a:avLst/>
-          </a:prstGeom>
-          <a:solidFill>
-            <a:srgbClr val="FFFF00"/>
-          </a:solidFill>
-          <a:ln>
-            <a:solidFill>
-              <a:schemeClr val="tx1"/>
-            </a:solidFill>
-          </a:ln>
-        </p:spPr>
-        <p:style>
-          <a:lnRef idx="2">
-            <a:schemeClr val="accent1">
-              <a:shade val="50000"/>
-            </a:schemeClr>
-          </a:lnRef>
-          <a:fillRef idx="1">
-            <a:schemeClr val="accent1"/>
-          </a:fillRef>
-          <a:effectRef idx="0">
-            <a:schemeClr val="accent1"/>
-          </a:effectRef>
-          <a:fontRef idx="minor">
-            <a:schemeClr val="lt1"/>
-          </a:fontRef>
-        </p:style>
-        <p:txBody>
-          <a:bodyPr rtlCol="0" anchor="ctr"/>
-          <a:lstStyle/>
+          <a:p>
+            <a:endParaRPr lang="pt-BR" sz="1500" dirty="0">
+              <a:solidFill>
+                <a:schemeClr val="tx1"/>
+              </a:solidFill>
+            </a:endParaRPr>
+          </a:p>
+          <a:p>
+            <a:r>
+              <a:rPr lang="pt-BR" sz="1500" dirty="0">
+                <a:solidFill>
+                  <a:schemeClr val="tx1"/>
+                </a:solidFill>
+              </a:rPr>
+              <a:t>Maior interatividade do usuário</a:t>
+            </a:r>
+          </a:p>
+          <a:p>
+            <a:r>
+              <a:rPr lang="pt-BR" sz="1500" dirty="0">
+                <a:solidFill>
+                  <a:schemeClr val="tx1"/>
+                </a:solidFill>
+              </a:rPr>
+              <a:t>Abranger mais usuários</a:t>
+            </a:r>
+          </a:p>
           <a:p>
             <a:pPr algn="ctr"/>
-            <a:endParaRPr lang="pt-BR"/>
+            <a:endParaRPr lang="pt-BR" dirty="0"/>
           </a:p>
         </p:txBody>
       </p:sp>
@@ -3186,8 +3353,14 @@
           <a:bodyPr rtlCol="0" anchor="ctr"/>
           <a:lstStyle/>
           <a:p>
-            <a:pPr algn="ctr"/>
-            <a:endParaRPr lang="pt-BR"/>
+            <a:r>
+              <a:rPr lang="pt-BR" dirty="0">
+                <a:solidFill>
+                  <a:schemeClr val="tx1"/>
+                </a:solidFill>
+              </a:rPr>
+              <a:t>Jogo em plataforma Mobile</a:t>
+            </a:r>
           </a:p>
         </p:txBody>
       </p:sp>
@@ -3236,18 +3409,13 @@
           <a:p>
             <a:pPr algn="ctr"/>
             <a:r>
-              <a:rPr lang="pt-BR" dirty="0" smtClean="0">
+              <a:rPr lang="pt-BR" dirty="0">
                 <a:solidFill>
                   <a:schemeClr val="tx1"/>
                 </a:solidFill>
               </a:rPr>
               <a:t>Empresas de Jogos</a:t>
             </a:r>
-            <a:endParaRPr lang="pt-BR" dirty="0">
-              <a:solidFill>
-                <a:schemeClr val="tx1"/>
-              </a:solidFill>
-            </a:endParaRPr>
           </a:p>
         </p:txBody>
       </p:sp>
@@ -3259,7 +3427,459 @@
         </p:nvSpPr>
         <p:spPr>
           <a:xfrm>
-            <a:off x="8889999" y="939800"/>
+            <a:off x="8778874" y="844348"/>
+            <a:ext cx="1993900" cy="1493585"/>
+          </a:xfrm>
+          <a:prstGeom prst="foldedCorner">
+            <a:avLst/>
+          </a:prstGeom>
+          <a:solidFill>
+            <a:srgbClr val="FFFF00"/>
+          </a:solidFill>
+          <a:ln>
+            <a:solidFill>
+              <a:schemeClr val="tx1"/>
+            </a:solidFill>
+          </a:ln>
+        </p:spPr>
+        <p:style>
+          <a:lnRef idx="2">
+            <a:schemeClr val="accent1">
+              <a:shade val="50000"/>
+            </a:schemeClr>
+          </a:lnRef>
+          <a:fillRef idx="1">
+            <a:schemeClr val="accent1"/>
+          </a:fillRef>
+          <a:effectRef idx="0">
+            <a:schemeClr val="accent1"/>
+          </a:effectRef>
+          <a:fontRef idx="minor">
+            <a:schemeClr val="lt1"/>
+          </a:fontRef>
+        </p:style>
+        <p:txBody>
+          <a:bodyPr rtlCol="0" anchor="ctr"/>
+          <a:lstStyle/>
+          <a:p>
+            <a:r>
+              <a:rPr lang="pt-BR" dirty="0">
+                <a:solidFill>
+                  <a:schemeClr val="tx1"/>
+                </a:solidFill>
+              </a:rPr>
+              <a:t>Adoecimento de Integrante do grupo (Corona - Grande Impacto)</a:t>
+            </a:r>
+          </a:p>
+          <a:p>
+            <a:pPr algn="ctr"/>
+            <a:endParaRPr lang="pt-BR" dirty="0"/>
+          </a:p>
+        </p:txBody>
+      </p:sp>
+      <p:sp>
+        <p:nvSpPr>
+          <p:cNvPr id="12" name="Canto Dobrado 11"/>
+          <p:cNvSpPr/>
+          <p:nvPr/>
+        </p:nvSpPr>
+        <p:spPr>
+          <a:xfrm>
+            <a:off x="5430586" y="3172295"/>
+            <a:ext cx="1120777" cy="1329930"/>
+          </a:xfrm>
+          <a:prstGeom prst="foldedCorner">
+            <a:avLst/>
+          </a:prstGeom>
+          <a:solidFill>
+            <a:srgbClr val="FFFF00"/>
+          </a:solidFill>
+          <a:ln>
+            <a:solidFill>
+              <a:schemeClr val="tx1"/>
+            </a:solidFill>
+          </a:ln>
+        </p:spPr>
+        <p:style>
+          <a:lnRef idx="2">
+            <a:schemeClr val="accent1">
+              <a:shade val="50000"/>
+            </a:schemeClr>
+          </a:lnRef>
+          <a:fillRef idx="1">
+            <a:schemeClr val="accent1"/>
+          </a:fillRef>
+          <a:effectRef idx="0">
+            <a:schemeClr val="accent1"/>
+          </a:effectRef>
+          <a:fontRef idx="minor">
+            <a:schemeClr val="lt1"/>
+          </a:fontRef>
+        </p:style>
+        <p:txBody>
+          <a:bodyPr rtlCol="0" anchor="ctr"/>
+          <a:lstStyle/>
+          <a:p>
+            <a:r>
+              <a:rPr lang="pt-BR" dirty="0">
+                <a:solidFill>
+                  <a:schemeClr val="tx1"/>
+                </a:solidFill>
+              </a:rPr>
+              <a:t>Joshua Matheus </a:t>
+            </a:r>
+          </a:p>
+          <a:p>
+            <a:r>
+              <a:rPr lang="pt-BR" dirty="0">
+                <a:solidFill>
+                  <a:schemeClr val="tx1"/>
+                </a:solidFill>
+              </a:rPr>
+              <a:t>Paulo</a:t>
+            </a:r>
+          </a:p>
+          <a:p>
+            <a:r>
+              <a:rPr lang="pt-BR" dirty="0">
+                <a:solidFill>
+                  <a:schemeClr val="tx1"/>
+                </a:solidFill>
+              </a:rPr>
+              <a:t>Tiago</a:t>
+            </a:r>
+          </a:p>
+        </p:txBody>
+      </p:sp>
+      <p:sp>
+        <p:nvSpPr>
+          <p:cNvPr id="14" name="Canto Dobrado 13"/>
+          <p:cNvSpPr/>
+          <p:nvPr/>
+        </p:nvSpPr>
+        <p:spPr>
+          <a:xfrm>
+            <a:off x="8724900" y="5489652"/>
+            <a:ext cx="1879600" cy="961948"/>
+          </a:xfrm>
+          <a:prstGeom prst="foldedCorner">
+            <a:avLst/>
+          </a:prstGeom>
+          <a:solidFill>
+            <a:srgbClr val="FFFF00"/>
+          </a:solidFill>
+          <a:ln>
+            <a:solidFill>
+              <a:schemeClr val="tx1"/>
+            </a:solidFill>
+          </a:ln>
+        </p:spPr>
+        <p:style>
+          <a:lnRef idx="2">
+            <a:schemeClr val="accent1">
+              <a:shade val="50000"/>
+            </a:schemeClr>
+          </a:lnRef>
+          <a:fillRef idx="1">
+            <a:schemeClr val="accent1"/>
+          </a:fillRef>
+          <a:effectRef idx="0">
+            <a:schemeClr val="accent1"/>
+          </a:effectRef>
+          <a:fontRef idx="minor">
+            <a:schemeClr val="lt1"/>
+          </a:fontRef>
+        </p:style>
+        <p:txBody>
+          <a:bodyPr rtlCol="0" anchor="ctr"/>
+          <a:lstStyle/>
+          <a:p>
+            <a:pPr marL="285750" indent="-285750">
+              <a:buFont typeface="Arial" panose="020B0604020202020204" pitchFamily="34" charset="0"/>
+              <a:buChar char="•"/>
+            </a:pPr>
+            <a:r>
+              <a:rPr lang="pt-BR" dirty="0">
+                <a:solidFill>
+                  <a:schemeClr val="tx1"/>
+                </a:solidFill>
+              </a:rPr>
+              <a:t>Tempo</a:t>
+            </a:r>
+          </a:p>
+          <a:p>
+            <a:pPr marL="285750" indent="-285750">
+              <a:buFont typeface="Arial" panose="020B0604020202020204" pitchFamily="34" charset="0"/>
+              <a:buChar char="•"/>
+            </a:pPr>
+            <a:r>
+              <a:rPr lang="pt-BR" dirty="0">
+                <a:solidFill>
+                  <a:schemeClr val="tx1"/>
+                </a:solidFill>
+              </a:rPr>
+              <a:t>Licença</a:t>
+            </a:r>
+          </a:p>
+          <a:p>
+            <a:pPr marL="285750" indent="-285750">
+              <a:buFont typeface="Arial" panose="020B0604020202020204" pitchFamily="34" charset="0"/>
+              <a:buChar char="•"/>
+            </a:pPr>
+            <a:r>
+              <a:rPr lang="pt-BR" dirty="0">
+                <a:solidFill>
+                  <a:schemeClr val="tx1"/>
+                </a:solidFill>
+              </a:rPr>
+              <a:t>Infra Estrutura</a:t>
+            </a:r>
+          </a:p>
+        </p:txBody>
+      </p:sp>
+      <p:sp>
+        <p:nvSpPr>
+          <p:cNvPr id="15" name="Canto Dobrado 14"/>
+          <p:cNvSpPr/>
+          <p:nvPr/>
+        </p:nvSpPr>
+        <p:spPr>
+          <a:xfrm>
+            <a:off x="5140325" y="5702300"/>
+            <a:ext cx="3349820" cy="430619"/>
+          </a:xfrm>
+          <a:prstGeom prst="foldedCorner">
+            <a:avLst/>
+          </a:prstGeom>
+          <a:solidFill>
+            <a:srgbClr val="FFFF00"/>
+          </a:solidFill>
+          <a:ln>
+            <a:solidFill>
+              <a:schemeClr val="tx1"/>
+            </a:solidFill>
+          </a:ln>
+        </p:spPr>
+        <p:style>
+          <a:lnRef idx="2">
+            <a:schemeClr val="accent1">
+              <a:shade val="50000"/>
+            </a:schemeClr>
+          </a:lnRef>
+          <a:fillRef idx="1">
+            <a:schemeClr val="accent1"/>
+          </a:fillRef>
+          <a:effectRef idx="0">
+            <a:schemeClr val="accent1"/>
+          </a:effectRef>
+          <a:fontRef idx="minor">
+            <a:schemeClr val="lt1"/>
+          </a:fontRef>
+        </p:style>
+        <p:txBody>
+          <a:bodyPr rtlCol="0" anchor="ctr"/>
+          <a:lstStyle/>
+          <a:p>
+            <a:r>
+              <a:rPr lang="pt-BR" sz="1300" dirty="0">
+                <a:solidFill>
+                  <a:schemeClr val="tx1"/>
+                </a:solidFill>
+              </a:rPr>
+              <a:t>Tamanho do game em </a:t>
+            </a:r>
+            <a:r>
+              <a:rPr lang="pt-BR" sz="1300" dirty="0" err="1">
+                <a:solidFill>
+                  <a:schemeClr val="tx1"/>
+                </a:solidFill>
+              </a:rPr>
+              <a:t>mbs</a:t>
+            </a:r>
+            <a:r>
+              <a:rPr lang="pt-BR" sz="1300" dirty="0">
+                <a:solidFill>
+                  <a:schemeClr val="tx1"/>
+                </a:solidFill>
+              </a:rPr>
+              <a:t> ultrapassando o tamanho máximo da loja.</a:t>
+            </a:r>
+          </a:p>
+        </p:txBody>
+      </p:sp>
+      <p:sp>
+        <p:nvSpPr>
+          <p:cNvPr id="17" name="Canto Dobrado 16"/>
+          <p:cNvSpPr/>
+          <p:nvPr/>
+        </p:nvSpPr>
+        <p:spPr>
+          <a:xfrm>
+            <a:off x="1404045" y="2447137"/>
+            <a:ext cx="1398979" cy="1134794"/>
+          </a:xfrm>
+          <a:prstGeom prst="foldedCorner">
+            <a:avLst/>
+          </a:prstGeom>
+          <a:solidFill>
+            <a:srgbClr val="FFFF00"/>
+          </a:solidFill>
+          <a:ln>
+            <a:solidFill>
+              <a:schemeClr val="tx1"/>
+            </a:solidFill>
+          </a:ln>
+        </p:spPr>
+        <p:style>
+          <a:lnRef idx="2">
+            <a:schemeClr val="accent1">
+              <a:shade val="50000"/>
+            </a:schemeClr>
+          </a:lnRef>
+          <a:fillRef idx="1">
+            <a:schemeClr val="accent1"/>
+          </a:fillRef>
+          <a:effectRef idx="0">
+            <a:schemeClr val="accent1"/>
+          </a:effectRef>
+          <a:fontRef idx="minor">
+            <a:schemeClr val="lt1"/>
+          </a:fontRef>
+        </p:style>
+        <p:txBody>
+          <a:bodyPr rtlCol="0" anchor="ctr"/>
+          <a:lstStyle/>
+          <a:p>
+            <a:r>
+              <a:rPr lang="pt-BR" dirty="0">
+                <a:solidFill>
+                  <a:schemeClr val="tx1"/>
+                </a:solidFill>
+              </a:rPr>
+              <a:t>que forneça dados para analise, </a:t>
+            </a:r>
+          </a:p>
+        </p:txBody>
+      </p:sp>
+      <p:sp>
+        <p:nvSpPr>
+          <p:cNvPr id="20" name="Canto Dobrado 19"/>
+          <p:cNvSpPr/>
+          <p:nvPr/>
+        </p:nvSpPr>
+        <p:spPr>
+          <a:xfrm>
+            <a:off x="1404045" y="4200049"/>
+            <a:ext cx="1313151" cy="688268"/>
+          </a:xfrm>
+          <a:prstGeom prst="foldedCorner">
+            <a:avLst/>
+          </a:prstGeom>
+          <a:solidFill>
+            <a:srgbClr val="FFFF00"/>
+          </a:solidFill>
+          <a:ln>
+            <a:solidFill>
+              <a:schemeClr val="tx1"/>
+            </a:solidFill>
+          </a:ln>
+        </p:spPr>
+        <p:style>
+          <a:lnRef idx="2">
+            <a:schemeClr val="accent1">
+              <a:shade val="50000"/>
+            </a:schemeClr>
+          </a:lnRef>
+          <a:fillRef idx="1">
+            <a:schemeClr val="accent1"/>
+          </a:fillRef>
+          <a:effectRef idx="0">
+            <a:schemeClr val="accent1"/>
+          </a:effectRef>
+          <a:fontRef idx="minor">
+            <a:schemeClr val="lt1"/>
+          </a:fontRef>
+        </p:style>
+        <p:txBody>
+          <a:bodyPr rtlCol="0" anchor="ctr"/>
+          <a:lstStyle/>
+          <a:p>
+            <a:pPr algn="ctr"/>
+            <a:r>
+              <a:rPr lang="pt-BR" dirty="0">
+                <a:solidFill>
+                  <a:schemeClr val="tx1"/>
+                </a:solidFill>
+              </a:rPr>
+              <a:t>Power BI</a:t>
+            </a:r>
+          </a:p>
+        </p:txBody>
+      </p:sp>
+      <p:sp>
+        <p:nvSpPr>
+          <p:cNvPr id="21" name="Canto Dobrado 20"/>
+          <p:cNvSpPr/>
+          <p:nvPr/>
+        </p:nvSpPr>
+        <p:spPr>
+          <a:xfrm>
+            <a:off x="1404045" y="4681576"/>
+            <a:ext cx="1714500" cy="1354989"/>
+          </a:xfrm>
+          <a:prstGeom prst="foldedCorner">
+            <a:avLst/>
+          </a:prstGeom>
+          <a:solidFill>
+            <a:srgbClr val="FFFF00"/>
+          </a:solidFill>
+          <a:ln>
+            <a:solidFill>
+              <a:schemeClr val="tx1"/>
+            </a:solidFill>
+          </a:ln>
+        </p:spPr>
+        <p:style>
+          <a:lnRef idx="2">
+            <a:schemeClr val="accent1">
+              <a:shade val="50000"/>
+            </a:schemeClr>
+          </a:lnRef>
+          <a:fillRef idx="1">
+            <a:schemeClr val="accent1"/>
+          </a:fillRef>
+          <a:effectRef idx="0">
+            <a:schemeClr val="accent1"/>
+          </a:effectRef>
+          <a:fontRef idx="minor">
+            <a:schemeClr val="lt1"/>
+          </a:fontRef>
+        </p:style>
+        <p:txBody>
+          <a:bodyPr rtlCol="0" anchor="ctr"/>
+          <a:lstStyle/>
+          <a:p>
+            <a:pPr algn="ctr"/>
+            <a:r>
+              <a:rPr lang="pt-BR" dirty="0">
+                <a:solidFill>
+                  <a:schemeClr val="tx1"/>
+                </a:solidFill>
+              </a:rPr>
+              <a:t>Lucro encima da analise de dados, gerando maiores vendas</a:t>
+            </a:r>
+          </a:p>
+        </p:txBody>
+      </p:sp>
+      <p:sp>
+        <p:nvSpPr>
+          <p:cNvPr id="23" name="Canto Dobrado 22"/>
+          <p:cNvSpPr/>
+          <p:nvPr/>
+        </p:nvSpPr>
+        <p:spPr>
+          <a:xfrm>
+            <a:off x="5422899" y="1520727"/>
             <a:ext cx="1371600" cy="1003300"/>
           </a:xfrm>
           <a:prstGeom prst="foldedCorner">
@@ -3295,20 +3915,27 @@
           <a:lstStyle/>
           <a:p>
             <a:pPr algn="ctr"/>
-            <a:endParaRPr lang="pt-BR"/>
-          </a:p>
-        </p:txBody>
-      </p:sp>
-      <p:sp>
-        <p:nvSpPr>
-          <p:cNvPr id="12" name="Canto Dobrado 11"/>
+            <a:r>
+              <a:rPr lang="pt-BR" dirty="0">
+                <a:solidFill>
+                  <a:schemeClr val="tx1"/>
+                </a:solidFill>
+              </a:rPr>
+              <a:t>Jogo não ser aceito no mercado</a:t>
+            </a:r>
+          </a:p>
+        </p:txBody>
+      </p:sp>
+      <p:sp>
+        <p:nvSpPr>
+          <p:cNvPr id="22" name="Canto Dobrado 21"/>
           <p:cNvSpPr/>
           <p:nvPr/>
         </p:nvSpPr>
         <p:spPr>
           <a:xfrm>
-            <a:off x="5216523" y="3178571"/>
-            <a:ext cx="1120777" cy="1329930"/>
+            <a:off x="276229" y="2358549"/>
+            <a:ext cx="1419222" cy="1029437"/>
           </a:xfrm>
           <a:prstGeom prst="foldedCorner">
             <a:avLst/>
@@ -3342,39 +3969,343 @@
           <a:bodyPr rtlCol="0" anchor="ctr"/>
           <a:lstStyle/>
           <a:p>
-            <a:r>
-              <a:rPr lang="pt-BR" dirty="0" smtClean="0">
+            <a:pPr algn="just"/>
+            <a:r>
+              <a:rPr lang="pt-BR" dirty="0">
                 <a:solidFill>
                   <a:schemeClr val="tx1"/>
                 </a:solidFill>
               </a:rPr>
-              <a:t>Joshua Matheus </a:t>
-            </a:r>
-          </a:p>
-          <a:p>
-            <a:r>
-              <a:rPr lang="pt-BR" dirty="0" smtClean="0">
+              <a:t>Desenvolvimento de um jogo Mobile</a:t>
+            </a:r>
+          </a:p>
+        </p:txBody>
+      </p:sp>
+      <p:sp>
+        <p:nvSpPr>
+          <p:cNvPr id="27" name="Canto Dobrado 26"/>
+          <p:cNvSpPr/>
+          <p:nvPr/>
+        </p:nvSpPr>
+        <p:spPr>
+          <a:xfrm>
+            <a:off x="6842916" y="939799"/>
+            <a:ext cx="1935958" cy="1507337"/>
+          </a:xfrm>
+          <a:prstGeom prst="foldedCorner">
+            <a:avLst/>
+          </a:prstGeom>
+          <a:solidFill>
+            <a:srgbClr val="FFFF00"/>
+          </a:solidFill>
+          <a:ln>
+            <a:solidFill>
+              <a:schemeClr val="tx1"/>
+            </a:solidFill>
+          </a:ln>
+        </p:spPr>
+        <p:style>
+          <a:lnRef idx="2">
+            <a:schemeClr val="accent1">
+              <a:shade val="50000"/>
+            </a:schemeClr>
+          </a:lnRef>
+          <a:fillRef idx="1">
+            <a:schemeClr val="accent1"/>
+          </a:fillRef>
+          <a:effectRef idx="0">
+            <a:schemeClr val="accent1"/>
+          </a:effectRef>
+          <a:fontRef idx="minor">
+            <a:schemeClr val="lt1"/>
+          </a:fontRef>
+        </p:style>
+        <p:txBody>
+          <a:bodyPr rtlCol="0" anchor="ctr"/>
+          <a:lstStyle/>
+          <a:p>
+            <a:pPr marL="285750" indent="-285750">
+              <a:buFont typeface="Arial" panose="020B0604020202020204" pitchFamily="34" charset="0"/>
+              <a:buChar char="•"/>
+            </a:pPr>
+            <a:r>
+              <a:rPr lang="pt-BR" dirty="0">
                 <a:solidFill>
                   <a:schemeClr val="tx1"/>
                 </a:solidFill>
               </a:rPr>
-              <a:t>Paulo</a:t>
-            </a:r>
-          </a:p>
-          <a:p>
-            <a:r>
-              <a:rPr lang="pt-BR" dirty="0" smtClean="0">
+              <a:t>Tempo p/ Jogar</a:t>
+            </a:r>
+          </a:p>
+          <a:p>
+            <a:pPr marL="285750" indent="-285750">
+              <a:buFont typeface="Arial" panose="020B0604020202020204" pitchFamily="34" charset="0"/>
+              <a:buChar char="•"/>
+            </a:pPr>
+            <a:r>
+              <a:rPr lang="pt-BR" dirty="0">
                 <a:solidFill>
                   <a:schemeClr val="tx1"/>
                 </a:solidFill>
               </a:rPr>
-              <a:t>Tiago</a:t>
+              <a:t>Internet</a:t>
+            </a:r>
+          </a:p>
+          <a:p>
+            <a:pPr marL="285750" indent="-285750">
+              <a:buFont typeface="Arial" panose="020B0604020202020204" pitchFamily="34" charset="0"/>
+              <a:buChar char="•"/>
+            </a:pPr>
+            <a:r>
+              <a:rPr lang="pt-BR" dirty="0">
+                <a:solidFill>
+                  <a:schemeClr val="tx1"/>
+                </a:solidFill>
+              </a:rPr>
+              <a:t>Celular </a:t>
+            </a:r>
+            <a:r>
+              <a:rPr lang="pt-BR" dirty="0" err="1">
+                <a:solidFill>
+                  <a:schemeClr val="tx1"/>
+                </a:solidFill>
+              </a:rPr>
+              <a:t>Android</a:t>
             </a:r>
             <a:endParaRPr lang="pt-BR" dirty="0">
               <a:solidFill>
                 <a:schemeClr val="tx1"/>
               </a:solidFill>
             </a:endParaRPr>
+          </a:p>
+        </p:txBody>
+      </p:sp>
+      <p:sp>
+        <p:nvSpPr>
+          <p:cNvPr id="36" name="Canto Dobrado 35"/>
+          <p:cNvSpPr/>
+          <p:nvPr/>
+        </p:nvSpPr>
+        <p:spPr>
+          <a:xfrm>
+            <a:off x="6912262" y="3083327"/>
+            <a:ext cx="1371600" cy="729882"/>
+          </a:xfrm>
+          <a:prstGeom prst="foldedCorner">
+            <a:avLst/>
+          </a:prstGeom>
+          <a:solidFill>
+            <a:srgbClr val="FFFF00"/>
+          </a:solidFill>
+          <a:ln>
+            <a:solidFill>
+              <a:schemeClr val="tx1"/>
+            </a:solidFill>
+          </a:ln>
+        </p:spPr>
+        <p:style>
+          <a:lnRef idx="2">
+            <a:schemeClr val="accent1">
+              <a:shade val="50000"/>
+            </a:schemeClr>
+          </a:lnRef>
+          <a:fillRef idx="1">
+            <a:schemeClr val="accent1"/>
+          </a:fillRef>
+          <a:effectRef idx="0">
+            <a:schemeClr val="accent1"/>
+          </a:effectRef>
+          <a:fontRef idx="minor">
+            <a:schemeClr val="lt1"/>
+          </a:fontRef>
+        </p:style>
+        <p:txBody>
+          <a:bodyPr rtlCol="0" anchor="ctr"/>
+          <a:lstStyle/>
+          <a:p>
+            <a:pPr algn="ctr"/>
+            <a:r>
+              <a:rPr lang="pt-BR" dirty="0">
+                <a:solidFill>
+                  <a:schemeClr val="tx1"/>
+                </a:solidFill>
+              </a:rPr>
+              <a:t>Requisitos da SPRINT 1</a:t>
+            </a:r>
+          </a:p>
+        </p:txBody>
+      </p:sp>
+      <p:sp>
+        <p:nvSpPr>
+          <p:cNvPr id="37" name="Canto Dobrado 36"/>
+          <p:cNvSpPr/>
+          <p:nvPr/>
+        </p:nvSpPr>
+        <p:spPr>
+          <a:xfrm>
+            <a:off x="7118544" y="3722315"/>
+            <a:ext cx="1371600" cy="829971"/>
+          </a:xfrm>
+          <a:prstGeom prst="foldedCorner">
+            <a:avLst/>
+          </a:prstGeom>
+          <a:solidFill>
+            <a:srgbClr val="00B0F0"/>
+          </a:solidFill>
+          <a:ln>
+            <a:solidFill>
+              <a:schemeClr val="tx1"/>
+            </a:solidFill>
+          </a:ln>
+        </p:spPr>
+        <p:style>
+          <a:lnRef idx="2">
+            <a:schemeClr val="accent1">
+              <a:shade val="50000"/>
+            </a:schemeClr>
+          </a:lnRef>
+          <a:fillRef idx="1">
+            <a:schemeClr val="accent1"/>
+          </a:fillRef>
+          <a:effectRef idx="0">
+            <a:schemeClr val="accent1"/>
+          </a:effectRef>
+          <a:fontRef idx="minor">
+            <a:schemeClr val="lt1"/>
+          </a:fontRef>
+        </p:style>
+        <p:txBody>
+          <a:bodyPr rtlCol="0" anchor="ctr"/>
+          <a:lstStyle/>
+          <a:p>
+            <a:pPr algn="ctr"/>
+            <a:r>
+              <a:rPr lang="pt-BR" dirty="0">
+                <a:solidFill>
+                  <a:schemeClr val="tx1"/>
+                </a:solidFill>
+              </a:rPr>
+              <a:t>Requisitos da SPRINT 2</a:t>
+            </a:r>
+          </a:p>
+        </p:txBody>
+      </p:sp>
+      <p:sp>
+        <p:nvSpPr>
+          <p:cNvPr id="38" name="Canto Dobrado 37"/>
+          <p:cNvSpPr/>
+          <p:nvPr/>
+        </p:nvSpPr>
+        <p:spPr>
+          <a:xfrm>
+            <a:off x="7328199" y="4388216"/>
+            <a:ext cx="1371600" cy="846330"/>
+          </a:xfrm>
+          <a:prstGeom prst="foldedCorner">
+            <a:avLst/>
+          </a:prstGeom>
+          <a:solidFill>
+            <a:srgbClr val="7030A0"/>
+          </a:solidFill>
+          <a:ln>
+            <a:solidFill>
+              <a:schemeClr val="tx1"/>
+            </a:solidFill>
+          </a:ln>
+        </p:spPr>
+        <p:style>
+          <a:lnRef idx="2">
+            <a:schemeClr val="accent1">
+              <a:shade val="50000"/>
+            </a:schemeClr>
+          </a:lnRef>
+          <a:fillRef idx="1">
+            <a:schemeClr val="accent1"/>
+          </a:fillRef>
+          <a:effectRef idx="0">
+            <a:schemeClr val="accent1"/>
+          </a:effectRef>
+          <a:fontRef idx="minor">
+            <a:schemeClr val="lt1"/>
+          </a:fontRef>
+        </p:style>
+        <p:txBody>
+          <a:bodyPr rtlCol="0" anchor="ctr"/>
+          <a:lstStyle/>
+          <a:p>
+            <a:pPr algn="ctr"/>
+            <a:r>
+              <a:rPr lang="pt-BR" dirty="0">
+                <a:solidFill>
+                  <a:schemeClr val="tx1"/>
+                </a:solidFill>
+              </a:rPr>
+              <a:t>Requisitos da SPRINT 3</a:t>
+            </a:r>
+          </a:p>
+        </p:txBody>
+      </p:sp>
+      <p:sp>
+        <p:nvSpPr>
+          <p:cNvPr id="31" name="Canto Dobrado 30">
+            <a:extLst>
+              <a:ext uri="{FF2B5EF4-FFF2-40B4-BE49-F238E27FC236}">
+                <a16:creationId xmlns:a16="http://schemas.microsoft.com/office/drawing/2014/main" id="{A4905376-33DB-5643-A7E7-8209CB3AA74B}"/>
+              </a:ext>
+            </a:extLst>
+          </p:cNvPr>
+          <p:cNvSpPr/>
+          <p:nvPr/>
+        </p:nvSpPr>
+        <p:spPr>
+          <a:xfrm>
+            <a:off x="8931273" y="1871394"/>
+            <a:ext cx="1762127" cy="1203113"/>
+          </a:xfrm>
+          <a:prstGeom prst="foldedCorner">
+            <a:avLst/>
+          </a:prstGeom>
+          <a:solidFill>
+            <a:srgbClr val="FFFF00"/>
+          </a:solidFill>
+          <a:ln>
+            <a:solidFill>
+              <a:schemeClr val="tx1"/>
+            </a:solidFill>
+          </a:ln>
+        </p:spPr>
+        <p:style>
+          <a:lnRef idx="2">
+            <a:schemeClr val="accent1">
+              <a:shade val="50000"/>
+            </a:schemeClr>
+          </a:lnRef>
+          <a:fillRef idx="1">
+            <a:schemeClr val="accent1"/>
+          </a:fillRef>
+          <a:effectRef idx="0">
+            <a:schemeClr val="accent1"/>
+          </a:effectRef>
+          <a:fontRef idx="minor">
+            <a:schemeClr val="lt1"/>
+          </a:fontRef>
+        </p:style>
+        <p:txBody>
+          <a:bodyPr rtlCol="0" anchor="ctr"/>
+          <a:lstStyle/>
+          <a:p>
+            <a:r>
+              <a:rPr lang="pt-BR" dirty="0">
+                <a:solidFill>
+                  <a:schemeClr val="tx1"/>
+                </a:solidFill>
+              </a:rPr>
+              <a:t>Falta de tempo para entrega do projeto</a:t>
+            </a:r>
+          </a:p>
+          <a:p>
+            <a:pPr algn="ctr"/>
+            <a:endParaRPr lang="pt-BR" dirty="0"/>
           </a:p>
         </p:txBody>
       </p:sp>
@@ -3423,7 +4354,7 @@
           <a:p>
             <a:pPr algn="ctr"/>
             <a:r>
-              <a:rPr lang="pt-BR" dirty="0" smtClean="0">
+              <a:rPr lang="pt-BR" dirty="0">
                 <a:solidFill>
                   <a:schemeClr val="tx1"/>
                 </a:solidFill>
@@ -3431,450 +4362,13 @@
               <a:t>SPRINT 1 </a:t>
             </a:r>
             <a:r>
-              <a:rPr lang="pt-BR" dirty="0" smtClean="0">
+              <a:rPr lang="pt-BR" dirty="0">
                 <a:solidFill>
                   <a:schemeClr val="tx1"/>
                 </a:solidFill>
                 <a:sym typeface="Wingdings" panose="05000000000000000000" pitchFamily="2" charset="2"/>
               </a:rPr>
               <a:t> 17/03/20</a:t>
-            </a:r>
-            <a:endParaRPr lang="pt-BR" dirty="0">
-              <a:solidFill>
-                <a:schemeClr val="tx1"/>
-              </a:solidFill>
-            </a:endParaRPr>
-          </a:p>
-        </p:txBody>
-      </p:sp>
-      <p:sp>
-        <p:nvSpPr>
-          <p:cNvPr id="14" name="Canto Dobrado 13"/>
-          <p:cNvSpPr/>
-          <p:nvPr/>
-        </p:nvSpPr>
-        <p:spPr>
-          <a:xfrm>
-            <a:off x="8724900" y="5489652"/>
-            <a:ext cx="1879600" cy="961948"/>
-          </a:xfrm>
-          <a:prstGeom prst="foldedCorner">
-            <a:avLst/>
-          </a:prstGeom>
-          <a:solidFill>
-            <a:srgbClr val="FFFF00"/>
-          </a:solidFill>
-          <a:ln>
-            <a:solidFill>
-              <a:schemeClr val="tx1"/>
-            </a:solidFill>
-          </a:ln>
-        </p:spPr>
-        <p:style>
-          <a:lnRef idx="2">
-            <a:schemeClr val="accent1">
-              <a:shade val="50000"/>
-            </a:schemeClr>
-          </a:lnRef>
-          <a:fillRef idx="1">
-            <a:schemeClr val="accent1"/>
-          </a:fillRef>
-          <a:effectRef idx="0">
-            <a:schemeClr val="accent1"/>
-          </a:effectRef>
-          <a:fontRef idx="minor">
-            <a:schemeClr val="lt1"/>
-          </a:fontRef>
-        </p:style>
-        <p:txBody>
-          <a:bodyPr rtlCol="0" anchor="ctr"/>
-          <a:lstStyle/>
-          <a:p>
-            <a:pPr marL="285750" indent="-285750">
-              <a:buFont typeface="Arial" panose="020B0604020202020204" pitchFamily="34" charset="0"/>
-              <a:buChar char="•"/>
-            </a:pPr>
-            <a:r>
-              <a:rPr lang="pt-BR" dirty="0" smtClean="0">
-                <a:solidFill>
-                  <a:schemeClr val="tx1"/>
-                </a:solidFill>
-              </a:rPr>
-              <a:t>Tempo</a:t>
-            </a:r>
-          </a:p>
-          <a:p>
-            <a:pPr marL="285750" indent="-285750">
-              <a:buFont typeface="Arial" panose="020B0604020202020204" pitchFamily="34" charset="0"/>
-              <a:buChar char="•"/>
-            </a:pPr>
-            <a:r>
-              <a:rPr lang="pt-BR" dirty="0" smtClean="0">
-                <a:solidFill>
-                  <a:schemeClr val="tx1"/>
-                </a:solidFill>
-              </a:rPr>
-              <a:t>Licença</a:t>
-            </a:r>
-          </a:p>
-          <a:p>
-            <a:pPr marL="285750" indent="-285750">
-              <a:buFont typeface="Arial" panose="020B0604020202020204" pitchFamily="34" charset="0"/>
-              <a:buChar char="•"/>
-            </a:pPr>
-            <a:r>
-              <a:rPr lang="pt-BR" dirty="0" smtClean="0">
-                <a:solidFill>
-                  <a:schemeClr val="tx1"/>
-                </a:solidFill>
-              </a:rPr>
-              <a:t>Infra Estrutura</a:t>
-            </a:r>
-          </a:p>
-        </p:txBody>
-      </p:sp>
-      <p:sp>
-        <p:nvSpPr>
-          <p:cNvPr id="15" name="Canto Dobrado 14"/>
-          <p:cNvSpPr/>
-          <p:nvPr/>
-        </p:nvSpPr>
-        <p:spPr>
-          <a:xfrm>
-            <a:off x="5359399" y="5702300"/>
-            <a:ext cx="3124199" cy="749300"/>
-          </a:xfrm>
-          <a:prstGeom prst="foldedCorner">
-            <a:avLst/>
-          </a:prstGeom>
-          <a:solidFill>
-            <a:srgbClr val="FFFF00"/>
-          </a:solidFill>
-          <a:ln>
-            <a:solidFill>
-              <a:schemeClr val="tx1"/>
-            </a:solidFill>
-          </a:ln>
-        </p:spPr>
-        <p:style>
-          <a:lnRef idx="2">
-            <a:schemeClr val="accent1">
-              <a:shade val="50000"/>
-            </a:schemeClr>
-          </a:lnRef>
-          <a:fillRef idx="1">
-            <a:schemeClr val="accent1"/>
-          </a:fillRef>
-          <a:effectRef idx="0">
-            <a:schemeClr val="accent1"/>
-          </a:effectRef>
-          <a:fontRef idx="minor">
-            <a:schemeClr val="lt1"/>
-          </a:fontRef>
-        </p:style>
-        <p:txBody>
-          <a:bodyPr rtlCol="0" anchor="ctr"/>
-          <a:lstStyle/>
-          <a:p>
-            <a:pPr algn="ctr"/>
-            <a:endParaRPr lang="pt-BR"/>
-          </a:p>
-        </p:txBody>
-      </p:sp>
-      <p:sp>
-        <p:nvSpPr>
-          <p:cNvPr id="17" name="Canto Dobrado 16"/>
-          <p:cNvSpPr/>
-          <p:nvPr/>
-        </p:nvSpPr>
-        <p:spPr>
-          <a:xfrm>
-            <a:off x="1404045" y="2447137"/>
-            <a:ext cx="1398979" cy="1134794"/>
-          </a:xfrm>
-          <a:prstGeom prst="foldedCorner">
-            <a:avLst/>
-          </a:prstGeom>
-          <a:solidFill>
-            <a:srgbClr val="FFFF00"/>
-          </a:solidFill>
-          <a:ln>
-            <a:solidFill>
-              <a:schemeClr val="tx1"/>
-            </a:solidFill>
-          </a:ln>
-        </p:spPr>
-        <p:style>
-          <a:lnRef idx="2">
-            <a:schemeClr val="accent1">
-              <a:shade val="50000"/>
-            </a:schemeClr>
-          </a:lnRef>
-          <a:fillRef idx="1">
-            <a:schemeClr val="accent1"/>
-          </a:fillRef>
-          <a:effectRef idx="0">
-            <a:schemeClr val="accent1"/>
-          </a:effectRef>
-          <a:fontRef idx="minor">
-            <a:schemeClr val="lt1"/>
-          </a:fontRef>
-        </p:style>
-        <p:txBody>
-          <a:bodyPr rtlCol="0" anchor="ctr"/>
-          <a:lstStyle/>
-          <a:p>
-            <a:r>
-              <a:rPr lang="pt-BR" dirty="0" smtClean="0">
-                <a:solidFill>
-                  <a:schemeClr val="tx1"/>
-                </a:solidFill>
-              </a:rPr>
-              <a:t>que forneça dados para analise, </a:t>
-            </a:r>
-            <a:endParaRPr lang="pt-BR" dirty="0">
-              <a:solidFill>
-                <a:schemeClr val="tx1"/>
-              </a:solidFill>
-            </a:endParaRPr>
-          </a:p>
-        </p:txBody>
-      </p:sp>
-      <p:sp>
-        <p:nvSpPr>
-          <p:cNvPr id="19" name="Canto Dobrado 18"/>
-          <p:cNvSpPr/>
-          <p:nvPr/>
-        </p:nvSpPr>
-        <p:spPr>
-          <a:xfrm>
-            <a:off x="3545282" y="3885017"/>
-            <a:ext cx="1371600" cy="1003300"/>
-          </a:xfrm>
-          <a:prstGeom prst="foldedCorner">
-            <a:avLst/>
-          </a:prstGeom>
-          <a:solidFill>
-            <a:srgbClr val="FFFF00"/>
-          </a:solidFill>
-          <a:ln>
-            <a:solidFill>
-              <a:schemeClr val="tx1"/>
-            </a:solidFill>
-          </a:ln>
-        </p:spPr>
-        <p:style>
-          <a:lnRef idx="2">
-            <a:schemeClr val="accent1">
-              <a:shade val="50000"/>
-            </a:schemeClr>
-          </a:lnRef>
-          <a:fillRef idx="1">
-            <a:schemeClr val="accent1"/>
-          </a:fillRef>
-          <a:effectRef idx="0">
-            <a:schemeClr val="accent1"/>
-          </a:effectRef>
-          <a:fontRef idx="minor">
-            <a:schemeClr val="lt1"/>
-          </a:fontRef>
-        </p:style>
-        <p:txBody>
-          <a:bodyPr rtlCol="0" anchor="ctr"/>
-          <a:lstStyle/>
-          <a:p>
-            <a:pPr algn="ctr"/>
-            <a:endParaRPr lang="pt-BR"/>
-          </a:p>
-        </p:txBody>
-      </p:sp>
-      <p:sp>
-        <p:nvSpPr>
-          <p:cNvPr id="20" name="Canto Dobrado 19"/>
-          <p:cNvSpPr/>
-          <p:nvPr/>
-        </p:nvSpPr>
-        <p:spPr>
-          <a:xfrm>
-            <a:off x="1404045" y="4200049"/>
-            <a:ext cx="1313151" cy="688268"/>
-          </a:xfrm>
-          <a:prstGeom prst="foldedCorner">
-            <a:avLst/>
-          </a:prstGeom>
-          <a:solidFill>
-            <a:srgbClr val="FFFF00"/>
-          </a:solidFill>
-          <a:ln>
-            <a:solidFill>
-              <a:schemeClr val="tx1"/>
-            </a:solidFill>
-          </a:ln>
-        </p:spPr>
-        <p:style>
-          <a:lnRef idx="2">
-            <a:schemeClr val="accent1">
-              <a:shade val="50000"/>
-            </a:schemeClr>
-          </a:lnRef>
-          <a:fillRef idx="1">
-            <a:schemeClr val="accent1"/>
-          </a:fillRef>
-          <a:effectRef idx="0">
-            <a:schemeClr val="accent1"/>
-          </a:effectRef>
-          <a:fontRef idx="minor">
-            <a:schemeClr val="lt1"/>
-          </a:fontRef>
-        </p:style>
-        <p:txBody>
-          <a:bodyPr rtlCol="0" anchor="ctr"/>
-          <a:lstStyle/>
-          <a:p>
-            <a:pPr algn="ctr"/>
-            <a:r>
-              <a:rPr lang="pt-BR" dirty="0" smtClean="0">
-                <a:solidFill>
-                  <a:schemeClr val="tx1"/>
-                </a:solidFill>
-              </a:rPr>
-              <a:t>Power BI</a:t>
-            </a:r>
-            <a:endParaRPr lang="pt-BR" dirty="0">
-              <a:solidFill>
-                <a:schemeClr val="tx1"/>
-              </a:solidFill>
-            </a:endParaRPr>
-          </a:p>
-        </p:txBody>
-      </p:sp>
-      <p:sp>
-        <p:nvSpPr>
-          <p:cNvPr id="21" name="Canto Dobrado 20"/>
-          <p:cNvSpPr/>
-          <p:nvPr/>
-        </p:nvSpPr>
-        <p:spPr>
-          <a:xfrm>
-            <a:off x="1404045" y="4681576"/>
-            <a:ext cx="1714500" cy="1354989"/>
-          </a:xfrm>
-          <a:prstGeom prst="foldedCorner">
-            <a:avLst/>
-          </a:prstGeom>
-          <a:solidFill>
-            <a:srgbClr val="FFFF00"/>
-          </a:solidFill>
-          <a:ln>
-            <a:solidFill>
-              <a:schemeClr val="tx1"/>
-            </a:solidFill>
-          </a:ln>
-        </p:spPr>
-        <p:style>
-          <a:lnRef idx="2">
-            <a:schemeClr val="accent1">
-              <a:shade val="50000"/>
-            </a:schemeClr>
-          </a:lnRef>
-          <a:fillRef idx="1">
-            <a:schemeClr val="accent1"/>
-          </a:fillRef>
-          <a:effectRef idx="0">
-            <a:schemeClr val="accent1"/>
-          </a:effectRef>
-          <a:fontRef idx="minor">
-            <a:schemeClr val="lt1"/>
-          </a:fontRef>
-        </p:style>
-        <p:txBody>
-          <a:bodyPr rtlCol="0" anchor="ctr"/>
-          <a:lstStyle/>
-          <a:p>
-            <a:pPr algn="ctr"/>
-            <a:r>
-              <a:rPr lang="pt-BR" dirty="0" smtClean="0">
-                <a:solidFill>
-                  <a:schemeClr val="tx1"/>
-                </a:solidFill>
-              </a:rPr>
-              <a:t>Lucro encima da analise de dados, gerando maiores vendas</a:t>
-            </a:r>
-            <a:endParaRPr lang="pt-BR" dirty="0">
-              <a:solidFill>
-                <a:schemeClr val="tx1"/>
-              </a:solidFill>
-            </a:endParaRPr>
-          </a:p>
-        </p:txBody>
-      </p:sp>
-      <p:sp>
-        <p:nvSpPr>
-          <p:cNvPr id="23" name="Canto Dobrado 22"/>
-          <p:cNvSpPr/>
-          <p:nvPr/>
-        </p:nvSpPr>
-        <p:spPr>
-          <a:xfrm>
-            <a:off x="5422899" y="1520727"/>
-            <a:ext cx="1371600" cy="1003300"/>
-          </a:xfrm>
-          <a:prstGeom prst="foldedCorner">
-            <a:avLst/>
-          </a:prstGeom>
-          <a:solidFill>
-            <a:srgbClr val="FFFF00"/>
-          </a:solidFill>
-          <a:ln>
-            <a:solidFill>
-              <a:schemeClr val="tx1"/>
-            </a:solidFill>
-          </a:ln>
-        </p:spPr>
-        <p:style>
-          <a:lnRef idx="2">
-            <a:schemeClr val="accent1">
-              <a:shade val="50000"/>
-            </a:schemeClr>
-          </a:lnRef>
-          <a:fillRef idx="1">
-            <a:schemeClr val="accent1"/>
-          </a:fillRef>
-          <a:effectRef idx="0">
-            <a:schemeClr val="accent1"/>
-          </a:effectRef>
-          <a:fontRef idx="minor">
-            <a:schemeClr val="lt1"/>
-          </a:fontRef>
-        </p:style>
-        <p:txBody>
-          <a:bodyPr rtlCol="0" anchor="ctr"/>
-          <a:lstStyle/>
-          <a:p>
-            <a:pPr algn="ctr"/>
-            <a:r>
-              <a:rPr lang="pt-BR" dirty="0" smtClean="0">
-                <a:solidFill>
-                  <a:schemeClr val="tx1"/>
-                </a:solidFill>
-              </a:rPr>
-              <a:t>Jogo não </a:t>
-            </a:r>
-            <a:r>
-              <a:rPr lang="pt-BR" dirty="0">
-                <a:solidFill>
-                  <a:schemeClr val="tx1"/>
-                </a:solidFill>
-              </a:rPr>
-              <a:t>s</a:t>
-            </a:r>
-            <a:r>
-              <a:rPr lang="pt-BR" dirty="0" smtClean="0">
-                <a:solidFill>
-                  <a:schemeClr val="tx1"/>
-                </a:solidFill>
-              </a:rPr>
-              <a:t>er aceito no mercado</a:t>
             </a:r>
             <a:endParaRPr lang="pt-BR" dirty="0">
               <a:solidFill>
@@ -3929,7 +4423,7 @@
           <a:p>
             <a:pPr algn="ctr"/>
             <a:r>
-              <a:rPr lang="pt-BR" dirty="0" smtClean="0">
+              <a:rPr lang="pt-BR" dirty="0">
                 <a:solidFill>
                   <a:schemeClr val="tx1"/>
                 </a:solidFill>
@@ -3937,7 +4431,7 @@
               <a:t>SPRINT 2 </a:t>
             </a:r>
             <a:r>
-              <a:rPr lang="pt-BR" dirty="0" smtClean="0">
+              <a:rPr lang="pt-BR" dirty="0">
                 <a:solidFill>
                   <a:schemeClr val="tx1"/>
                 </a:solidFill>
@@ -3998,7 +4492,7 @@
           <a:p>
             <a:pPr algn="ctr"/>
             <a:r>
-              <a:rPr lang="pt-BR" dirty="0" smtClean="0">
+              <a:rPr lang="pt-BR" dirty="0">
                 <a:solidFill>
                   <a:schemeClr val="tx1"/>
                 </a:solidFill>
@@ -4006,7 +4500,7 @@
               <a:t>SPRINT 3 </a:t>
             </a:r>
             <a:r>
-              <a:rPr lang="pt-BR" dirty="0" smtClean="0">
+              <a:rPr lang="pt-BR" dirty="0">
                 <a:solidFill>
                   <a:schemeClr val="tx1"/>
                 </a:solidFill>
@@ -4024,14 +4518,82 @@
       </p:sp>
       <p:sp>
         <p:nvSpPr>
-          <p:cNvPr id="22" name="Canto Dobrado 21"/>
+          <p:cNvPr id="33" name="Canto Dobrado 32">
+            <a:extLst>
+              <a:ext uri="{FF2B5EF4-FFF2-40B4-BE49-F238E27FC236}">
+                <a16:creationId xmlns:a16="http://schemas.microsoft.com/office/drawing/2014/main" id="{1BCAB9F5-AF21-B94B-8D95-9A0815CC3644}"/>
+              </a:ext>
+            </a:extLst>
+          </p:cNvPr>
           <p:cNvSpPr/>
           <p:nvPr/>
         </p:nvSpPr>
         <p:spPr>
           <a:xfrm>
-            <a:off x="276229" y="2358549"/>
-            <a:ext cx="1419222" cy="1029437"/>
+            <a:off x="5275573" y="6048874"/>
+            <a:ext cx="2738426" cy="760539"/>
+          </a:xfrm>
+          <a:prstGeom prst="foldedCorner">
+            <a:avLst>
+              <a:gd name="adj" fmla="val 50000"/>
+            </a:avLst>
+          </a:prstGeom>
+          <a:solidFill>
+            <a:srgbClr val="FFFF00"/>
+          </a:solidFill>
+          <a:ln>
+            <a:solidFill>
+              <a:schemeClr val="tx1"/>
+            </a:solidFill>
+          </a:ln>
+        </p:spPr>
+        <p:style>
+          <a:lnRef idx="2">
+            <a:schemeClr val="accent1">
+              <a:shade val="50000"/>
+            </a:schemeClr>
+          </a:lnRef>
+          <a:fillRef idx="1">
+            <a:schemeClr val="accent1"/>
+          </a:fillRef>
+          <a:effectRef idx="0">
+            <a:schemeClr val="accent1"/>
+          </a:effectRef>
+          <a:fontRef idx="minor">
+            <a:schemeClr val="lt1"/>
+          </a:fontRef>
+        </p:style>
+        <p:txBody>
+          <a:bodyPr rtlCol="0" anchor="ctr"/>
+          <a:lstStyle/>
+          <a:p>
+            <a:r>
+              <a:rPr lang="pt-BR" sz="1300" dirty="0">
+                <a:solidFill>
+                  <a:schemeClr val="tx1"/>
+                </a:solidFill>
+              </a:rPr>
+              <a:t>Todos integrantes deveram participar e entregar</a:t>
+            </a:r>
+          </a:p>
+        </p:txBody>
+      </p:sp>
+      <p:sp>
+        <p:nvSpPr>
+          <p:cNvPr id="32" name="Canto Dobrado 31">
+            <a:extLst>
+              <a:ext uri="{FF2B5EF4-FFF2-40B4-BE49-F238E27FC236}">
+                <a16:creationId xmlns:a16="http://schemas.microsoft.com/office/drawing/2014/main" id="{180FE136-9BDB-3345-8DC1-CDC6326E8A48}"/>
+              </a:ext>
+            </a:extLst>
+          </p:cNvPr>
+          <p:cNvSpPr/>
+          <p:nvPr/>
+        </p:nvSpPr>
+        <p:spPr>
+          <a:xfrm>
+            <a:off x="5508428" y="6434039"/>
+            <a:ext cx="3191071" cy="456033"/>
           </a:xfrm>
           <a:prstGeom prst="foldedCorner">
             <a:avLst/>
@@ -4065,411 +4627,14 @@
           <a:bodyPr rtlCol="0" anchor="ctr"/>
           <a:lstStyle/>
           <a:p>
-            <a:pPr algn="just"/>
-            <a:r>
-              <a:rPr lang="pt-BR" dirty="0" smtClean="0">
+            <a:r>
+              <a:rPr lang="pt-BR" sz="1300" dirty="0">
                 <a:solidFill>
                   <a:schemeClr val="tx1"/>
                 </a:solidFill>
               </a:rPr>
-              <a:t>Desenvolvimento de um jogo Mobile</a:t>
-            </a:r>
-            <a:endParaRPr lang="pt-BR" dirty="0">
-              <a:solidFill>
-                <a:schemeClr val="tx1"/>
-              </a:solidFill>
-            </a:endParaRPr>
-          </a:p>
-        </p:txBody>
-      </p:sp>
-      <p:sp>
-        <p:nvSpPr>
-          <p:cNvPr id="27" name="Canto Dobrado 26"/>
-          <p:cNvSpPr/>
-          <p:nvPr/>
-        </p:nvSpPr>
-        <p:spPr>
-          <a:xfrm>
-            <a:off x="6842916" y="939799"/>
-            <a:ext cx="1935958" cy="1507337"/>
-          </a:xfrm>
-          <a:prstGeom prst="foldedCorner">
-            <a:avLst/>
-          </a:prstGeom>
-          <a:solidFill>
-            <a:srgbClr val="FFFF00"/>
-          </a:solidFill>
-          <a:ln>
-            <a:solidFill>
-              <a:schemeClr val="tx1"/>
-            </a:solidFill>
-          </a:ln>
-        </p:spPr>
-        <p:style>
-          <a:lnRef idx="2">
-            <a:schemeClr val="accent1">
-              <a:shade val="50000"/>
-            </a:schemeClr>
-          </a:lnRef>
-          <a:fillRef idx="1">
-            <a:schemeClr val="accent1"/>
-          </a:fillRef>
-          <a:effectRef idx="0">
-            <a:schemeClr val="accent1"/>
-          </a:effectRef>
-          <a:fontRef idx="minor">
-            <a:schemeClr val="lt1"/>
-          </a:fontRef>
-        </p:style>
-        <p:txBody>
-          <a:bodyPr rtlCol="0" anchor="ctr"/>
-          <a:lstStyle/>
-          <a:p>
-            <a:pPr marL="285750" indent="-285750">
-              <a:buFont typeface="Arial" panose="020B0604020202020204" pitchFamily="34" charset="0"/>
-              <a:buChar char="•"/>
-            </a:pPr>
-            <a:r>
-              <a:rPr lang="pt-BR" dirty="0" smtClean="0">
-                <a:solidFill>
-                  <a:schemeClr val="tx1"/>
-                </a:solidFill>
-              </a:rPr>
-              <a:t>Tempo p/ Jogar</a:t>
-            </a:r>
-          </a:p>
-          <a:p>
-            <a:pPr marL="285750" indent="-285750">
-              <a:buFont typeface="Arial" panose="020B0604020202020204" pitchFamily="34" charset="0"/>
-              <a:buChar char="•"/>
-            </a:pPr>
-            <a:r>
-              <a:rPr lang="pt-BR" dirty="0" smtClean="0">
-                <a:solidFill>
-                  <a:schemeClr val="tx1"/>
-                </a:solidFill>
-              </a:rPr>
-              <a:t>Internet</a:t>
-            </a:r>
-          </a:p>
-          <a:p>
-            <a:pPr marL="285750" indent="-285750">
-              <a:buFont typeface="Arial" panose="020B0604020202020204" pitchFamily="34" charset="0"/>
-              <a:buChar char="•"/>
-            </a:pPr>
-            <a:r>
-              <a:rPr lang="pt-BR" dirty="0" smtClean="0">
-                <a:solidFill>
-                  <a:schemeClr val="tx1"/>
-                </a:solidFill>
-              </a:rPr>
-              <a:t>Celular </a:t>
-            </a:r>
-            <a:r>
-              <a:rPr lang="pt-BR" dirty="0" err="1" smtClean="0">
-                <a:solidFill>
-                  <a:schemeClr val="tx1"/>
-                </a:solidFill>
-              </a:rPr>
-              <a:t>Android</a:t>
-            </a:r>
-            <a:endParaRPr lang="pt-BR" dirty="0" smtClean="0">
-              <a:solidFill>
-                <a:schemeClr val="tx1"/>
-              </a:solidFill>
-            </a:endParaRPr>
-          </a:p>
-        </p:txBody>
-      </p:sp>
-      <p:sp>
-        <p:nvSpPr>
-          <p:cNvPr id="28" name="Canto Dobrado 27"/>
-          <p:cNvSpPr/>
-          <p:nvPr/>
-        </p:nvSpPr>
-        <p:spPr>
-          <a:xfrm>
-            <a:off x="3892944" y="3146759"/>
-            <a:ext cx="1254127" cy="962890"/>
-          </a:xfrm>
-          <a:prstGeom prst="foldedCorner">
-            <a:avLst/>
-          </a:prstGeom>
-          <a:solidFill>
-            <a:srgbClr val="FFFF00"/>
-          </a:solidFill>
-          <a:ln>
-            <a:solidFill>
-              <a:schemeClr val="tx1"/>
-            </a:solidFill>
-          </a:ln>
-        </p:spPr>
-        <p:style>
-          <a:lnRef idx="2">
-            <a:schemeClr val="accent1">
-              <a:shade val="50000"/>
-            </a:schemeClr>
-          </a:lnRef>
-          <a:fillRef idx="1">
-            <a:schemeClr val="accent1"/>
-          </a:fillRef>
-          <a:effectRef idx="0">
-            <a:schemeClr val="accent1"/>
-          </a:effectRef>
-          <a:fontRef idx="minor">
-            <a:schemeClr val="lt1"/>
-          </a:fontRef>
-        </p:style>
-        <p:txBody>
-          <a:bodyPr rtlCol="0" anchor="ctr"/>
-          <a:lstStyle/>
-          <a:p>
-            <a:pPr algn="ctr"/>
-            <a:endParaRPr lang="pt-BR"/>
-          </a:p>
-        </p:txBody>
-      </p:sp>
-      <p:sp>
-        <p:nvSpPr>
-          <p:cNvPr id="29" name="Canto Dobrado 28"/>
-          <p:cNvSpPr/>
-          <p:nvPr/>
-        </p:nvSpPr>
-        <p:spPr>
-          <a:xfrm>
-            <a:off x="3899693" y="2435194"/>
-            <a:ext cx="1240631" cy="927100"/>
-          </a:xfrm>
-          <a:prstGeom prst="foldedCorner">
-            <a:avLst/>
-          </a:prstGeom>
-          <a:solidFill>
-            <a:srgbClr val="FFFF00"/>
-          </a:solidFill>
-          <a:ln>
-            <a:solidFill>
-              <a:schemeClr val="tx1"/>
-            </a:solidFill>
-          </a:ln>
-        </p:spPr>
-        <p:style>
-          <a:lnRef idx="2">
-            <a:schemeClr val="accent1">
-              <a:shade val="50000"/>
-            </a:schemeClr>
-          </a:lnRef>
-          <a:fillRef idx="1">
-            <a:schemeClr val="accent1"/>
-          </a:fillRef>
-          <a:effectRef idx="0">
-            <a:schemeClr val="accent1"/>
-          </a:effectRef>
-          <a:fontRef idx="minor">
-            <a:schemeClr val="lt1"/>
-          </a:fontRef>
-        </p:style>
-        <p:txBody>
-          <a:bodyPr rtlCol="0" anchor="ctr"/>
-          <a:lstStyle/>
-          <a:p>
-            <a:pPr algn="ctr"/>
-            <a:endParaRPr lang="pt-BR"/>
-          </a:p>
-        </p:txBody>
-      </p:sp>
-      <p:sp>
-        <p:nvSpPr>
-          <p:cNvPr id="36" name="Canto Dobrado 35"/>
-          <p:cNvSpPr/>
-          <p:nvPr/>
-        </p:nvSpPr>
-        <p:spPr>
-          <a:xfrm>
-            <a:off x="6912262" y="3083327"/>
-            <a:ext cx="1371600" cy="729882"/>
-          </a:xfrm>
-          <a:prstGeom prst="foldedCorner">
-            <a:avLst/>
-          </a:prstGeom>
-          <a:solidFill>
-            <a:srgbClr val="FFFF00"/>
-          </a:solidFill>
-          <a:ln>
-            <a:solidFill>
-              <a:schemeClr val="tx1"/>
-            </a:solidFill>
-          </a:ln>
-        </p:spPr>
-        <p:style>
-          <a:lnRef idx="2">
-            <a:schemeClr val="accent1">
-              <a:shade val="50000"/>
-            </a:schemeClr>
-          </a:lnRef>
-          <a:fillRef idx="1">
-            <a:schemeClr val="accent1"/>
-          </a:fillRef>
-          <a:effectRef idx="0">
-            <a:schemeClr val="accent1"/>
-          </a:effectRef>
-          <a:fontRef idx="minor">
-            <a:schemeClr val="lt1"/>
-          </a:fontRef>
-        </p:style>
-        <p:txBody>
-          <a:bodyPr rtlCol="0" anchor="ctr"/>
-          <a:lstStyle/>
-          <a:p>
-            <a:pPr algn="ctr"/>
-            <a:r>
-              <a:rPr lang="pt-BR" dirty="0" smtClean="0">
-                <a:solidFill>
-                  <a:schemeClr val="tx1"/>
-                </a:solidFill>
-              </a:rPr>
-              <a:t>Requisitos da SPRINT 1</a:t>
-            </a:r>
-            <a:endParaRPr lang="pt-BR" dirty="0">
-              <a:solidFill>
-                <a:schemeClr val="tx1"/>
-              </a:solidFill>
-            </a:endParaRPr>
-          </a:p>
-        </p:txBody>
-      </p:sp>
-      <p:sp>
-        <p:nvSpPr>
-          <p:cNvPr id="37" name="Canto Dobrado 36"/>
-          <p:cNvSpPr/>
-          <p:nvPr/>
-        </p:nvSpPr>
-        <p:spPr>
-          <a:xfrm>
-            <a:off x="7118544" y="3722315"/>
-            <a:ext cx="1371600" cy="829971"/>
-          </a:xfrm>
-          <a:prstGeom prst="foldedCorner">
-            <a:avLst/>
-          </a:prstGeom>
-          <a:solidFill>
-            <a:srgbClr val="00B0F0"/>
-          </a:solidFill>
-          <a:ln>
-            <a:solidFill>
-              <a:schemeClr val="tx1"/>
-            </a:solidFill>
-          </a:ln>
-        </p:spPr>
-        <p:style>
-          <a:lnRef idx="2">
-            <a:schemeClr val="accent1">
-              <a:shade val="50000"/>
-            </a:schemeClr>
-          </a:lnRef>
-          <a:fillRef idx="1">
-            <a:schemeClr val="accent1"/>
-          </a:fillRef>
-          <a:effectRef idx="0">
-            <a:schemeClr val="accent1"/>
-          </a:effectRef>
-          <a:fontRef idx="minor">
-            <a:schemeClr val="lt1"/>
-          </a:fontRef>
-        </p:style>
-        <p:txBody>
-          <a:bodyPr rtlCol="0" anchor="ctr"/>
-          <a:lstStyle/>
-          <a:p>
-            <a:pPr algn="ctr"/>
-            <a:r>
-              <a:rPr lang="pt-BR" dirty="0" smtClean="0">
-                <a:solidFill>
-                  <a:schemeClr val="tx1"/>
-                </a:solidFill>
-              </a:rPr>
-              <a:t>Requisitos da </a:t>
-            </a:r>
-            <a:r>
-              <a:rPr lang="pt-BR" dirty="0" smtClean="0">
-                <a:solidFill>
-                  <a:schemeClr val="tx1"/>
-                </a:solidFill>
-              </a:rPr>
-              <a:t>SPRINT 2</a:t>
-            </a:r>
-            <a:endParaRPr lang="pt-BR" dirty="0">
-              <a:solidFill>
-                <a:schemeClr val="tx1"/>
-              </a:solidFill>
-            </a:endParaRPr>
-          </a:p>
-        </p:txBody>
-      </p:sp>
-      <p:sp>
-        <p:nvSpPr>
-          <p:cNvPr id="38" name="Canto Dobrado 37"/>
-          <p:cNvSpPr/>
-          <p:nvPr/>
-        </p:nvSpPr>
-        <p:spPr>
-          <a:xfrm>
-            <a:off x="7328199" y="4388216"/>
-            <a:ext cx="1371600" cy="846330"/>
-          </a:xfrm>
-          <a:prstGeom prst="foldedCorner">
-            <a:avLst/>
-          </a:prstGeom>
-          <a:solidFill>
-            <a:srgbClr val="7030A0"/>
-          </a:solidFill>
-          <a:ln>
-            <a:solidFill>
-              <a:schemeClr val="tx1"/>
-            </a:solidFill>
-          </a:ln>
-        </p:spPr>
-        <p:style>
-          <a:lnRef idx="2">
-            <a:schemeClr val="accent1">
-              <a:shade val="50000"/>
-            </a:schemeClr>
-          </a:lnRef>
-          <a:fillRef idx="1">
-            <a:schemeClr val="accent1"/>
-          </a:fillRef>
-          <a:effectRef idx="0">
-            <a:schemeClr val="accent1"/>
-          </a:effectRef>
-          <a:fontRef idx="minor">
-            <a:schemeClr val="lt1"/>
-          </a:fontRef>
-        </p:style>
-        <p:txBody>
-          <a:bodyPr rtlCol="0" anchor="ctr"/>
-          <a:lstStyle/>
-          <a:p>
-            <a:pPr algn="ctr"/>
-            <a:r>
-              <a:rPr lang="pt-BR" dirty="0" smtClean="0">
-                <a:solidFill>
-                  <a:schemeClr val="tx1"/>
-                </a:solidFill>
-              </a:rPr>
-              <a:t>Requisitos da </a:t>
-            </a:r>
-            <a:r>
-              <a:rPr lang="pt-BR" dirty="0" smtClean="0">
-                <a:solidFill>
-                  <a:schemeClr val="tx1"/>
-                </a:solidFill>
-              </a:rPr>
-              <a:t>SPRINT 3</a:t>
-            </a:r>
-            <a:endParaRPr lang="pt-BR" dirty="0">
-              <a:solidFill>
-                <a:schemeClr val="tx1"/>
-              </a:solidFill>
-            </a:endParaRPr>
+              <a:t>O projeto não pode Ultrapassar o tempo de  entrega</a:t>
+            </a:r>
           </a:p>
         </p:txBody>
       </p:sp>

</xml_diff>